<commit_message>
Ajout du Daily Scrum
</commit_message>
<xml_diff>
--- a/présentation.pptx
+++ b/présentation.pptx
@@ -5,10 +5,10 @@
     <p:sldMasterId id="2147483673" r:id="rId1"/>
   </p:sldMasterIdLst>
   <p:notesMasterIdLst>
-    <p:notesMasterId r:id="rId12"/>
+    <p:notesMasterId r:id="rId14"/>
   </p:notesMasterIdLst>
   <p:handoutMasterIdLst>
-    <p:handoutMasterId r:id="rId13"/>
+    <p:handoutMasterId r:id="rId15"/>
   </p:handoutMasterIdLst>
   <p:sldIdLst>
     <p:sldId id="257" r:id="rId2"/>
@@ -17,10 +17,12 @@
     <p:sldId id="262" r:id="rId5"/>
     <p:sldId id="258" r:id="rId6"/>
     <p:sldId id="263" r:id="rId7"/>
-    <p:sldId id="265" r:id="rId8"/>
-    <p:sldId id="264" r:id="rId9"/>
-    <p:sldId id="266" r:id="rId10"/>
-    <p:sldId id="267" r:id="rId11"/>
+    <p:sldId id="268" r:id="rId8"/>
+    <p:sldId id="265" r:id="rId9"/>
+    <p:sldId id="264" r:id="rId10"/>
+    <p:sldId id="269" r:id="rId11"/>
+    <p:sldId id="266" r:id="rId12"/>
+    <p:sldId id="267" r:id="rId13"/>
   </p:sldIdLst>
   <p:sldSz cx="12192000" cy="6858000"/>
   <p:notesSz cx="6858000" cy="9144000"/>
@@ -214,7 +216,7 @@
             <a:pPr rtl="0"/>
             <a:fld id="{D541C455-0541-42CB-85F2-EF2EB726E407}" type="datetime1">
               <a:rPr lang="fr-FR" smtClean="0"/>
-              <a:t>16/08/2021</a:t>
+              <a:t>17/08/2021</a:t>
             </a:fld>
             <a:endParaRPr lang="en-US" dirty="0"/>
           </a:p>
@@ -384,7 +386,7 @@
             <a:pPr rtl="0"/>
             <a:fld id="{139F4AB6-716B-4E95-AAD2-DB349D9AC9BA}" type="datetime1">
               <a:rPr lang="fr-FR" smtClean="0"/>
-              <a:t>16/08/2021</a:t>
+              <a:t>17/08/2021</a:t>
             </a:fld>
             <a:endParaRPr lang="en-US"/>
           </a:p>
@@ -1129,7 +1131,7 @@
             <a:pPr rtl="0"/>
             <a:fld id="{43B6331D-8BD5-4AF5-97EE-8FB3C79FE924}" type="datetime1">
               <a:rPr lang="fr-FR" smtClean="0"/>
-              <a:t>16/08/2021</a:t>
+              <a:t>17/08/2021</a:t>
             </a:fld>
             <a:endParaRPr lang="en-US" dirty="0"/>
           </a:p>
@@ -1335,7 +1337,7 @@
             <a:pPr rtl="0"/>
             <a:fld id="{C09D1B91-EF9C-42FB-BBE2-597FDE1B14D7}" type="datetime1">
               <a:rPr lang="fr-FR" smtClean="0"/>
-              <a:t>16/08/2021</a:t>
+              <a:t>17/08/2021</a:t>
             </a:fld>
             <a:endParaRPr lang="en-US"/>
           </a:p>
@@ -1523,7 +1525,7 @@
             <a:pPr rtl="0"/>
             <a:fld id="{2F733226-97BF-4FE9-8F44-80542C0EB53C}" type="datetime1">
               <a:rPr lang="fr-FR" smtClean="0"/>
-              <a:t>16/08/2021</a:t>
+              <a:t>17/08/2021</a:t>
             </a:fld>
             <a:endParaRPr lang="en-US"/>
           </a:p>
@@ -1697,7 +1699,7 @@
             <a:pPr rtl="0"/>
             <a:fld id="{802FE938-1586-4780-B61A-DD3B60BAB93C}" type="datetime1">
               <a:rPr lang="fr-FR" smtClean="0"/>
-              <a:t>16/08/2021</a:t>
+              <a:t>17/08/2021</a:t>
             </a:fld>
             <a:endParaRPr lang="en-US"/>
           </a:p>
@@ -2300,7 +2302,7 @@
             <a:pPr rtl="0"/>
             <a:fld id="{57CE27EF-4081-4F92-AC85-8FD255C3955B}" type="datetime1">
               <a:rPr lang="fr-FR" smtClean="0"/>
-              <a:t>16/08/2021</a:t>
+              <a:t>17/08/2021</a:t>
             </a:fld>
             <a:endParaRPr lang="en-US" dirty="0"/>
           </a:p>
@@ -2624,7 +2626,7 @@
             <a:pPr rtl="0"/>
             <a:fld id="{22E52E25-1182-4E86-836C-7D703787597C}" type="datetime1">
               <a:rPr lang="fr-FR" smtClean="0"/>
-              <a:t>16/08/2021</a:t>
+              <a:t>17/08/2021</a:t>
             </a:fld>
             <a:endParaRPr lang="en-US"/>
           </a:p>
@@ -3065,7 +3067,7 @@
             <a:pPr rtl="0"/>
             <a:fld id="{007B49E2-AD49-4B10-A213-CF194D4A25A3}" type="datetime1">
               <a:rPr lang="fr-FR" smtClean="0"/>
-              <a:t>16/08/2021</a:t>
+              <a:t>17/08/2021</a:t>
             </a:fld>
             <a:endParaRPr lang="en-US"/>
           </a:p>
@@ -3187,7 +3189,7 @@
             <a:pPr rtl="0"/>
             <a:fld id="{25FB4F25-64BB-460E-8192-B4AC51BA66FC}" type="datetime1">
               <a:rPr lang="fr-FR" smtClean="0"/>
-              <a:t>16/08/2021</a:t>
+              <a:t>17/08/2021</a:t>
             </a:fld>
             <a:endParaRPr lang="en-US"/>
           </a:p>
@@ -3285,7 +3287,7 @@
             <a:pPr rtl="0"/>
             <a:fld id="{2BD66AC7-6890-4F0E-B000-A39D822B7C00}" type="datetime1">
               <a:rPr lang="fr-FR" smtClean="0"/>
-              <a:t>16/08/2021</a:t>
+              <a:t>17/08/2021</a:t>
             </a:fld>
             <a:endParaRPr lang="en-US"/>
           </a:p>
@@ -3706,7 +3708,7 @@
             <a:pPr rtl="0"/>
             <a:fld id="{F7B0F5FB-B743-44F1-84BA-99C248DB6023}" type="datetime1">
               <a:rPr lang="fr-FR" smtClean="0"/>
-              <a:t>16/08/2021</a:t>
+              <a:t>17/08/2021</a:t>
             </a:fld>
             <a:endParaRPr lang="en-US"/>
           </a:p>
@@ -3971,7 +3973,7 @@
             <a:pPr rtl="0"/>
             <a:fld id="{C80E5F3D-7A62-48B1-A43E-C6091B37429D}" type="datetime1">
               <a:rPr lang="fr-FR" smtClean="0"/>
-              <a:t>16/08/2021</a:t>
+              <a:t>17/08/2021</a:t>
             </a:fld>
             <a:endParaRPr lang="en-US" dirty="0"/>
           </a:p>
@@ -4491,7 +4493,7 @@
             <a:pPr rtl="0"/>
             <a:fld id="{020D9D58-8984-498B-A4DA-61EAC8A72DD8}" type="datetime1">
               <a:rPr lang="fr-FR" smtClean="0"/>
-              <a:t>16/08/2021</a:t>
+              <a:t>17/08/2021</a:t>
             </a:fld>
             <a:endParaRPr lang="en-US" dirty="0"/>
           </a:p>
@@ -5191,18 +5193,13 @@
               </a:spcAft>
             </a:pPr>
             <a:r>
-              <a:rPr lang="fr">
+              <a:rPr lang="fr" dirty="0">
                 <a:solidFill>
                   <a:schemeClr val="tx1"/>
                 </a:solidFill>
               </a:rPr>
               <a:t>Anti-Covid</a:t>
             </a:r>
-            <a:endParaRPr lang="fr" dirty="0">
-              <a:solidFill>
-                <a:schemeClr val="tx1"/>
-              </a:solidFill>
-            </a:endParaRPr>
           </a:p>
         </p:txBody>
       </p:sp>
@@ -5241,6 +5238,346 @@
           <p:cNvPr id="2" name="Titre 1">
             <a:extLst>
               <a:ext uri="{FF2B5EF4-FFF2-40B4-BE49-F238E27FC236}">
+                <a16:creationId xmlns:a16="http://schemas.microsoft.com/office/drawing/2014/main" id="{ECF9D479-703F-47CE-AD11-A432DDDA8B84}"/>
+              </a:ext>
+            </a:extLst>
+          </p:cNvPr>
+          <p:cNvSpPr>
+            <a:spLocks noGrp="1"/>
+          </p:cNvSpPr>
+          <p:nvPr>
+            <p:ph type="title"/>
+          </p:nvPr>
+        </p:nvSpPr>
+        <p:spPr/>
+        <p:txBody>
+          <a:bodyPr/>
+          <a:lstStyle/>
+          <a:p>
+            <a:r>
+              <a:rPr lang="fr-FR" dirty="0"/>
+              <a:t>Daily Scrum</a:t>
+            </a:r>
+          </a:p>
+        </p:txBody>
+      </p:sp>
+      <p:sp>
+        <p:nvSpPr>
+          <p:cNvPr id="3" name="Espace réservé du texte 2">
+            <a:extLst>
+              <a:ext uri="{FF2B5EF4-FFF2-40B4-BE49-F238E27FC236}">
+                <a16:creationId xmlns:a16="http://schemas.microsoft.com/office/drawing/2014/main" id="{79BFB4C0-CECD-4B28-AAAE-2FBCBC05876F}"/>
+              </a:ext>
+            </a:extLst>
+          </p:cNvPr>
+          <p:cNvSpPr>
+            <a:spLocks noGrp="1"/>
+          </p:cNvSpPr>
+          <p:nvPr>
+            <p:ph type="body" idx="1"/>
+          </p:nvPr>
+        </p:nvSpPr>
+        <p:spPr/>
+        <p:txBody>
+          <a:bodyPr/>
+          <a:lstStyle/>
+          <a:p>
+            <a:endParaRPr lang="fr-FR"/>
+          </a:p>
+        </p:txBody>
+      </p:sp>
+      <p:sp>
+        <p:nvSpPr>
+          <p:cNvPr id="4" name="Espace réservé du contenu 3">
+            <a:extLst>
+              <a:ext uri="{FF2B5EF4-FFF2-40B4-BE49-F238E27FC236}">
+                <a16:creationId xmlns:a16="http://schemas.microsoft.com/office/drawing/2014/main" id="{AB6F6D5C-902D-4B80-AE10-38255FE93718}"/>
+              </a:ext>
+            </a:extLst>
+          </p:cNvPr>
+          <p:cNvSpPr>
+            <a:spLocks noGrp="1"/>
+          </p:cNvSpPr>
+          <p:nvPr>
+            <p:ph sz="half" idx="2"/>
+          </p:nvPr>
+        </p:nvSpPr>
+        <p:spPr/>
+        <p:txBody>
+          <a:bodyPr/>
+          <a:lstStyle/>
+          <a:p>
+            <a:endParaRPr lang="fr-FR" dirty="0"/>
+          </a:p>
+        </p:txBody>
+      </p:sp>
+      <p:sp>
+        <p:nvSpPr>
+          <p:cNvPr id="5" name="Espace réservé du texte 4">
+            <a:extLst>
+              <a:ext uri="{FF2B5EF4-FFF2-40B4-BE49-F238E27FC236}">
+                <a16:creationId xmlns:a16="http://schemas.microsoft.com/office/drawing/2014/main" id="{86B51AFC-79C8-4019-AE60-171EF6D22851}"/>
+              </a:ext>
+            </a:extLst>
+          </p:cNvPr>
+          <p:cNvSpPr>
+            <a:spLocks noGrp="1"/>
+          </p:cNvSpPr>
+          <p:nvPr>
+            <p:ph type="body" sz="quarter" idx="3"/>
+          </p:nvPr>
+        </p:nvSpPr>
+        <p:spPr/>
+        <p:txBody>
+          <a:bodyPr/>
+          <a:lstStyle/>
+          <a:p>
+            <a:endParaRPr lang="fr-FR"/>
+          </a:p>
+        </p:txBody>
+      </p:sp>
+      <p:sp>
+        <p:nvSpPr>
+          <p:cNvPr id="6" name="Espace réservé du contenu 5">
+            <a:extLst>
+              <a:ext uri="{FF2B5EF4-FFF2-40B4-BE49-F238E27FC236}">
+                <a16:creationId xmlns:a16="http://schemas.microsoft.com/office/drawing/2014/main" id="{E1542CC6-603D-4A62-B063-6480807C61EF}"/>
+              </a:ext>
+            </a:extLst>
+          </p:cNvPr>
+          <p:cNvSpPr>
+            <a:spLocks noGrp="1"/>
+          </p:cNvSpPr>
+          <p:nvPr>
+            <p:ph sz="quarter" idx="4"/>
+          </p:nvPr>
+        </p:nvSpPr>
+        <p:spPr/>
+        <p:txBody>
+          <a:bodyPr/>
+          <a:lstStyle/>
+          <a:p>
+            <a:endParaRPr lang="fr-FR"/>
+          </a:p>
+        </p:txBody>
+      </p:sp>
+      <p:sp>
+        <p:nvSpPr>
+          <p:cNvPr id="7" name="Espace réservé de la date 6">
+            <a:extLst>
+              <a:ext uri="{FF2B5EF4-FFF2-40B4-BE49-F238E27FC236}">
+                <a16:creationId xmlns:a16="http://schemas.microsoft.com/office/drawing/2014/main" id="{DFDCFAE5-7DE6-45F6-8652-D14C3D1A0717}"/>
+              </a:ext>
+            </a:extLst>
+          </p:cNvPr>
+          <p:cNvSpPr>
+            <a:spLocks noGrp="1"/>
+          </p:cNvSpPr>
+          <p:nvPr>
+            <p:ph type="dt" sz="half" idx="10"/>
+          </p:nvPr>
+        </p:nvSpPr>
+        <p:spPr/>
+        <p:txBody>
+          <a:bodyPr/>
+          <a:lstStyle/>
+          <a:p>
+            <a:pPr rtl="0"/>
+            <a:fld id="{007B49E2-AD49-4B10-A213-CF194D4A25A3}" type="datetime1">
+              <a:rPr lang="fr-FR" smtClean="0"/>
+              <a:t>17/08/2021</a:t>
+            </a:fld>
+            <a:endParaRPr lang="en-US"/>
+          </a:p>
+        </p:txBody>
+      </p:sp>
+    </p:spTree>
+    <p:extLst>
+      <p:ext uri="{BB962C8B-B14F-4D97-AF65-F5344CB8AC3E}">
+        <p14:creationId xmlns:p14="http://schemas.microsoft.com/office/powerpoint/2010/main" val="46181368"/>
+      </p:ext>
+    </p:extLst>
+  </p:cSld>
+  <p:clrMapOvr>
+    <a:masterClrMapping/>
+  </p:clrMapOvr>
+</p:sld>
+</file>
+
+<file path=ppt/slides/slide11.xml><?xml version="1.0" encoding="utf-8"?>
+<p:sld xmlns:a="http://schemas.openxmlformats.org/drawingml/2006/main" xmlns:r="http://schemas.openxmlformats.org/officeDocument/2006/relationships" xmlns:p="http://schemas.openxmlformats.org/presentationml/2006/main">
+  <p:cSld>
+    <p:spTree>
+      <p:nvGrpSpPr>
+        <p:cNvPr id="1" name=""/>
+        <p:cNvGrpSpPr/>
+        <p:nvPr/>
+      </p:nvGrpSpPr>
+      <p:grpSpPr>
+        <a:xfrm>
+          <a:off x="0" y="0"/>
+          <a:ext cx="0" cy="0"/>
+          <a:chOff x="0" y="0"/>
+          <a:chExt cx="0" cy="0"/>
+        </a:xfrm>
+      </p:grpSpPr>
+      <p:sp>
+        <p:nvSpPr>
+          <p:cNvPr id="2" name="Titre 1">
+            <a:extLst>
+              <a:ext uri="{FF2B5EF4-FFF2-40B4-BE49-F238E27FC236}">
+                <a16:creationId xmlns:a16="http://schemas.microsoft.com/office/drawing/2014/main" id="{138BF542-1475-4F67-960B-AD7AC244D790}"/>
+              </a:ext>
+            </a:extLst>
+          </p:cNvPr>
+          <p:cNvSpPr>
+            <a:spLocks noGrp="1"/>
+          </p:cNvSpPr>
+          <p:nvPr>
+            <p:ph type="title"/>
+          </p:nvPr>
+        </p:nvSpPr>
+        <p:spPr/>
+        <p:txBody>
+          <a:bodyPr/>
+          <a:lstStyle/>
+          <a:p>
+            <a:r>
+              <a:rPr lang="fr-FR" dirty="0"/>
+              <a:t>Sprint </a:t>
+            </a:r>
+            <a:r>
+              <a:rPr lang="fr-FR" dirty="0" err="1"/>
+              <a:t>Review</a:t>
+            </a:r>
+            <a:endParaRPr lang="fr-FR" dirty="0"/>
+          </a:p>
+        </p:txBody>
+      </p:sp>
+      <p:sp>
+        <p:nvSpPr>
+          <p:cNvPr id="3" name="Espace réservé du contenu 2">
+            <a:extLst>
+              <a:ext uri="{FF2B5EF4-FFF2-40B4-BE49-F238E27FC236}">
+                <a16:creationId xmlns:a16="http://schemas.microsoft.com/office/drawing/2014/main" id="{C81E2F24-0AFE-495E-88D9-C4BE720FEAE5}"/>
+              </a:ext>
+            </a:extLst>
+          </p:cNvPr>
+          <p:cNvSpPr>
+            <a:spLocks noGrp="1"/>
+          </p:cNvSpPr>
+          <p:nvPr>
+            <p:ph idx="1"/>
+          </p:nvPr>
+        </p:nvSpPr>
+        <p:spPr/>
+        <p:txBody>
+          <a:bodyPr/>
+          <a:lstStyle/>
+          <a:p>
+            <a:r>
+              <a:rPr lang="fr-FR" dirty="0"/>
+              <a:t>Amélioration : </a:t>
+            </a:r>
+          </a:p>
+          <a:p>
+            <a:pPr lvl="1"/>
+            <a:r>
+              <a:rPr lang="fr-FR" dirty="0"/>
+              <a:t>Utilisation du module « </a:t>
+            </a:r>
+            <a:r>
+              <a:rPr lang="fr-FR" dirty="0" err="1"/>
+              <a:t>Stripe</a:t>
+            </a:r>
+            <a:r>
+              <a:rPr lang="fr-FR" dirty="0"/>
+              <a:t> </a:t>
+            </a:r>
+            <a:r>
+              <a:rPr lang="fr-FR" dirty="0" err="1"/>
+              <a:t>Payment</a:t>
+            </a:r>
+            <a:r>
+              <a:rPr lang="fr-FR" dirty="0"/>
+              <a:t> </a:t>
+            </a:r>
+            <a:r>
+              <a:rPr lang="fr-FR" dirty="0" err="1"/>
+              <a:t>Integration</a:t>
+            </a:r>
+            <a:r>
+              <a:rPr lang="fr-FR" dirty="0"/>
+              <a:t> » pour le paiement</a:t>
+            </a:r>
+          </a:p>
+        </p:txBody>
+      </p:sp>
+      <p:sp>
+        <p:nvSpPr>
+          <p:cNvPr id="4" name="Espace réservé de la date 3">
+            <a:extLst>
+              <a:ext uri="{FF2B5EF4-FFF2-40B4-BE49-F238E27FC236}">
+                <a16:creationId xmlns:a16="http://schemas.microsoft.com/office/drawing/2014/main" id="{7F6B6DF8-1348-4226-A446-7F3B64E68843}"/>
+              </a:ext>
+            </a:extLst>
+          </p:cNvPr>
+          <p:cNvSpPr>
+            <a:spLocks noGrp="1"/>
+          </p:cNvSpPr>
+          <p:nvPr>
+            <p:ph type="dt" sz="half" idx="10"/>
+          </p:nvPr>
+        </p:nvSpPr>
+        <p:spPr/>
+        <p:txBody>
+          <a:bodyPr/>
+          <a:lstStyle/>
+          <a:p>
+            <a:pPr rtl="0"/>
+            <a:fld id="{802FE938-1586-4780-B61A-DD3B60BAB93C}" type="datetime1">
+              <a:rPr lang="fr-FR" smtClean="0"/>
+              <a:t>17/08/2021</a:t>
+            </a:fld>
+            <a:endParaRPr lang="en-US"/>
+          </a:p>
+        </p:txBody>
+      </p:sp>
+    </p:spTree>
+    <p:extLst>
+      <p:ext uri="{BB962C8B-B14F-4D97-AF65-F5344CB8AC3E}">
+        <p14:creationId xmlns:p14="http://schemas.microsoft.com/office/powerpoint/2010/main" val="2947631941"/>
+      </p:ext>
+    </p:extLst>
+  </p:cSld>
+  <p:clrMapOvr>
+    <a:masterClrMapping/>
+  </p:clrMapOvr>
+</p:sld>
+</file>
+
+<file path=ppt/slides/slide12.xml><?xml version="1.0" encoding="utf-8"?>
+<p:sld xmlns:a="http://schemas.openxmlformats.org/drawingml/2006/main" xmlns:r="http://schemas.openxmlformats.org/officeDocument/2006/relationships" xmlns:p="http://schemas.openxmlformats.org/presentationml/2006/main">
+  <p:cSld>
+    <p:spTree>
+      <p:nvGrpSpPr>
+        <p:cNvPr id="1" name=""/>
+        <p:cNvGrpSpPr/>
+        <p:nvPr/>
+      </p:nvGrpSpPr>
+      <p:grpSpPr>
+        <a:xfrm>
+          <a:off x="0" y="0"/>
+          <a:ext cx="0" cy="0"/>
+          <a:chOff x="0" y="0"/>
+          <a:chExt cx="0" cy="0"/>
+        </a:xfrm>
+      </p:grpSpPr>
+      <p:sp>
+        <p:nvSpPr>
+          <p:cNvPr id="2" name="Titre 1">
+            <a:extLst>
+              <a:ext uri="{FF2B5EF4-FFF2-40B4-BE49-F238E27FC236}">
                 <a16:creationId xmlns:a16="http://schemas.microsoft.com/office/drawing/2014/main" id="{81FE283B-3A92-4B5B-B199-1FE77176895C}"/>
               </a:ext>
             </a:extLst>
@@ -5252,15 +5589,25 @@
             <p:ph type="title"/>
           </p:nvPr>
         </p:nvSpPr>
-        <p:spPr/>
+        <p:spPr>
+          <a:xfrm>
+            <a:off x="1066800" y="558704"/>
+            <a:ext cx="10058400" cy="1371600"/>
+          </a:xfrm>
+        </p:spPr>
         <p:txBody>
           <a:bodyPr/>
           <a:lstStyle/>
           <a:p>
             <a:r>
               <a:rPr lang="fr-FR" dirty="0"/>
-              <a:t>Sprint Retrospective</a:t>
-            </a:r>
+              <a:t>Product </a:t>
+            </a:r>
+            <a:r>
+              <a:rPr lang="fr-FR"/>
+              <a:t>Backlog</a:t>
+            </a:r>
+            <a:endParaRPr lang="fr-FR" dirty="0"/>
           </a:p>
         </p:txBody>
       </p:sp>
@@ -5285,7 +5632,7 @@
           <a:bodyPr/>
           <a:lstStyle/>
           <a:p>
-            <a:endParaRPr lang="fr-FR"/>
+            <a:endParaRPr lang="fr-FR" dirty="0"/>
           </a:p>
         </p:txBody>
       </p:sp>
@@ -5313,7 +5660,7 @@
             <a:pPr rtl="0"/>
             <a:fld id="{802FE938-1586-4780-B61A-DD3B60BAB93C}" type="datetime1">
               <a:rPr lang="fr-FR" smtClean="0"/>
-              <a:t>16/08/2021</a:t>
+              <a:t>17/08/2021</a:t>
             </a:fld>
             <a:endParaRPr lang="en-US"/>
           </a:p>
@@ -5372,11 +5719,11 @@
           <a:p>
             <a:r>
               <a:rPr lang="fr-FR" dirty="0"/>
-              <a:t>Product </a:t>
+              <a:t>Anti-</a:t>
             </a:r>
             <a:r>
               <a:rPr lang="fr-FR" dirty="0" err="1"/>
-              <a:t>Backlog</a:t>
+              <a:t>Covid</a:t>
             </a:r>
             <a:endParaRPr lang="fr-FR" dirty="0"/>
           </a:p>
@@ -5459,7 +5806,7 @@
             <a:pPr rtl="0"/>
             <a:fld id="{802FE938-1586-4780-B61A-DD3B60BAB93C}" type="datetime1">
               <a:rPr lang="fr-FR" smtClean="0"/>
-              <a:t>16/08/2021</a:t>
+              <a:t>17/08/2021</a:t>
             </a:fld>
             <a:endParaRPr lang="en-US"/>
           </a:p>
@@ -5692,7 +6039,7 @@
             </a:pPr>
             <a:r>
               <a:rPr lang="fr-FR" dirty="0"/>
-              <a:t>Benjamin PRADON</a:t>
+              <a:t>Benjamin PRADON (backend)</a:t>
             </a:r>
           </a:p>
           <a:p>
@@ -5701,7 +6048,7 @@
             </a:pPr>
             <a:r>
               <a:rPr lang="fr-FR" dirty="0"/>
-              <a:t>Mohamed SAFIR</a:t>
+              <a:t>Mohamed SAFIR (base de données)</a:t>
             </a:r>
           </a:p>
           <a:p>
@@ -5710,7 +6057,7 @@
             </a:pPr>
             <a:r>
               <a:rPr lang="fr-FR" dirty="0"/>
-              <a:t>Fatima BRAHAMI</a:t>
+              <a:t>Fatima BRAHAMI (base de données)</a:t>
             </a:r>
           </a:p>
           <a:p>
@@ -5719,7 +6066,7 @@
             </a:pPr>
             <a:r>
               <a:rPr lang="fr-FR" dirty="0"/>
-              <a:t>Chaimae EL GHOUBACHI</a:t>
+              <a:t>Chaimae EL GHOUBACHI (frontend)</a:t>
             </a:r>
           </a:p>
         </p:txBody>
@@ -5748,7 +6095,7 @@
             <a:pPr rtl="0"/>
             <a:fld id="{22E52E25-1182-4E86-836C-7D703787597C}" type="datetime1">
               <a:rPr lang="fr-FR" smtClean="0"/>
-              <a:t>16/08/2021</a:t>
+              <a:t>17/08/2021</a:t>
             </a:fld>
             <a:endParaRPr lang="en-US"/>
           </a:p>
@@ -5893,7 +6240,7 @@
           <a:p>
             <a:r>
               <a:rPr lang="fr-FR" dirty="0"/>
-              <a:t>Durée : 2 jours</a:t>
+              <a:t>Durée : 1,5 jours</a:t>
             </a:r>
           </a:p>
           <a:p>
@@ -5907,7 +6254,15 @@
             </a:r>
             <a:r>
               <a:rPr lang="fr-FR" dirty="0"/>
-              <a:t> : Développement d’un site web classique de base avec la base de données et les pages de présentation</a:t>
+              <a:t> : Développement d’un site web classique de base avec la base de données et les pages de présentation </a:t>
+            </a:r>
+            <a:r>
+              <a:rPr lang="fr-FR" dirty="0" err="1"/>
+              <a:t>ansi</a:t>
+            </a:r>
+            <a:r>
+              <a:rPr lang="fr-FR" dirty="0"/>
+              <a:t> que l’espace membre</a:t>
             </a:r>
           </a:p>
         </p:txBody>
@@ -5977,7 +6332,7 @@
             </a:r>
             <a:r>
               <a:rPr lang="fr-FR" dirty="0"/>
-              <a:t> : Intégration de l’espace membre ainsi que du système de commande</a:t>
+              <a:t> : Intégration du module e-commerce</a:t>
             </a:r>
           </a:p>
         </p:txBody>
@@ -6006,7 +6361,7 @@
             <a:pPr rtl="0"/>
             <a:fld id="{007B49E2-AD49-4B10-A213-CF194D4A25A3}" type="datetime1">
               <a:rPr lang="fr-FR" smtClean="0"/>
-              <a:t>16/08/2021</a:t>
+              <a:t>17/08/2021</a:t>
             </a:fld>
             <a:endParaRPr lang="en-US"/>
           </a:p>
@@ -6219,7 +6574,7 @@
             <a:pPr rtl="0"/>
             <a:fld id="{007B49E2-AD49-4B10-A213-CF194D4A25A3}" type="datetime1">
               <a:rPr lang="fr-FR" smtClean="0"/>
-              <a:t>16/08/2021</a:t>
+              <a:t>17/08/2021</a:t>
             </a:fld>
             <a:endParaRPr lang="en-US"/>
           </a:p>
@@ -6314,7 +6669,7 @@
             <a:pPr rtl="0"/>
             <a:fld id="{43B6331D-8BD5-4AF5-97EE-8FB3C79FE924}" type="datetime1">
               <a:rPr lang="fr-FR" smtClean="0"/>
-              <a:t>16/08/2021</a:t>
+              <a:t>17/08/2021</a:t>
             </a:fld>
             <a:endParaRPr lang="en-US" dirty="0"/>
           </a:p>
@@ -6355,7 +6710,7 @@
           <p:cNvPr id="2" name="Titre 1">
             <a:extLst>
               <a:ext uri="{FF2B5EF4-FFF2-40B4-BE49-F238E27FC236}">
-                <a16:creationId xmlns:a16="http://schemas.microsoft.com/office/drawing/2014/main" id="{138BF542-1475-4F67-960B-AD7AC244D790}"/>
+                <a16:creationId xmlns:a16="http://schemas.microsoft.com/office/drawing/2014/main" id="{FA4C7E86-DA9C-41F2-B569-4C4B9DC7C2EB}"/>
               </a:ext>
             </a:extLst>
           </p:cNvPr>
@@ -6373,22 +6728,17 @@
           <a:p>
             <a:r>
               <a:rPr lang="fr-FR" dirty="0"/>
-              <a:t>Sprint </a:t>
-            </a:r>
-            <a:r>
-              <a:rPr lang="fr-FR" dirty="0" err="1"/>
-              <a:t>Review</a:t>
-            </a:r>
-            <a:endParaRPr lang="fr-FR" dirty="0"/>
-          </a:p>
-        </p:txBody>
-      </p:sp>
-      <p:sp>
-        <p:nvSpPr>
-          <p:cNvPr id="3" name="Espace réservé du contenu 2">
+              <a:t>Daily Scrum</a:t>
+            </a:r>
+          </a:p>
+        </p:txBody>
+      </p:sp>
+      <p:sp>
+        <p:nvSpPr>
+          <p:cNvPr id="3" name="Espace réservé du texte 2">
             <a:extLst>
               <a:ext uri="{FF2B5EF4-FFF2-40B4-BE49-F238E27FC236}">
-                <a16:creationId xmlns:a16="http://schemas.microsoft.com/office/drawing/2014/main" id="{C81E2F24-0AFE-495E-88D9-C4BE720FEAE5}"/>
+                <a16:creationId xmlns:a16="http://schemas.microsoft.com/office/drawing/2014/main" id="{520EC52C-3D52-4922-A80C-4CC7FF71BD62}"/>
               </a:ext>
             </a:extLst>
           </p:cNvPr>
@@ -6396,7 +6746,7 @@
             <a:spLocks noGrp="1"/>
           </p:cNvSpPr>
           <p:nvPr>
-            <p:ph idx="1"/>
+            <p:ph type="body" idx="1"/>
           </p:nvPr>
         </p:nvSpPr>
         <p:spPr/>
@@ -6404,16 +6754,19 @@
           <a:bodyPr/>
           <a:lstStyle/>
           <a:p>
-            <a:endParaRPr lang="fr-FR"/>
-          </a:p>
-        </p:txBody>
-      </p:sp>
-      <p:sp>
-        <p:nvSpPr>
-          <p:cNvPr id="4" name="Espace réservé de la date 3">
+            <a:r>
+              <a:rPr lang="fr-FR" dirty="0"/>
+              <a:t>Lundi 16 : Après midi</a:t>
+            </a:r>
+          </a:p>
+        </p:txBody>
+      </p:sp>
+      <p:sp>
+        <p:nvSpPr>
+          <p:cNvPr id="4" name="Espace réservé du contenu 3">
             <a:extLst>
               <a:ext uri="{FF2B5EF4-FFF2-40B4-BE49-F238E27FC236}">
-                <a16:creationId xmlns:a16="http://schemas.microsoft.com/office/drawing/2014/main" id="{7F6B6DF8-1348-4226-A446-7F3B64E68843}"/>
+                <a16:creationId xmlns:a16="http://schemas.microsoft.com/office/drawing/2014/main" id="{9B3E1DFD-D4D4-4BCE-AA7B-4B8BCA9023C4}"/>
               </a:ext>
             </a:extLst>
           </p:cNvPr>
@@ -6421,6 +6774,102 @@
             <a:spLocks noGrp="1"/>
           </p:cNvSpPr>
           <p:nvPr>
+            <p:ph sz="half" idx="2"/>
+          </p:nvPr>
+        </p:nvSpPr>
+        <p:spPr/>
+        <p:txBody>
+          <a:bodyPr/>
+          <a:lstStyle/>
+          <a:p>
+            <a:r>
+              <a:rPr lang="fr-FR" dirty="0"/>
+              <a:t>Mohamed : A composé la base de données avec des produits pour la boutiques</a:t>
+            </a:r>
+          </a:p>
+          <a:p>
+            <a:r>
+              <a:rPr lang="fr-FR" dirty="0"/>
+              <a:t>Benjamin : A créé le système d’espace membre</a:t>
+            </a:r>
+          </a:p>
+          <a:p>
+            <a:r>
+              <a:rPr lang="fr-FR" dirty="0"/>
+              <a:t>Chaimae : A construit le template graphique du site</a:t>
+            </a:r>
+          </a:p>
+        </p:txBody>
+      </p:sp>
+      <p:sp>
+        <p:nvSpPr>
+          <p:cNvPr id="5" name="Espace réservé du texte 4">
+            <a:extLst>
+              <a:ext uri="{FF2B5EF4-FFF2-40B4-BE49-F238E27FC236}">
+                <a16:creationId xmlns:a16="http://schemas.microsoft.com/office/drawing/2014/main" id="{003DE6A7-77BE-4979-AB3F-E9FD6F1924E6}"/>
+              </a:ext>
+            </a:extLst>
+          </p:cNvPr>
+          <p:cNvSpPr>
+            <a:spLocks noGrp="1"/>
+          </p:cNvSpPr>
+          <p:nvPr>
+            <p:ph type="body" sz="quarter" idx="3"/>
+          </p:nvPr>
+        </p:nvSpPr>
+        <p:spPr/>
+        <p:txBody>
+          <a:bodyPr/>
+          <a:lstStyle/>
+          <a:p>
+            <a:r>
+              <a:rPr lang="fr-FR" dirty="0"/>
+              <a:t>Mardi 17</a:t>
+            </a:r>
+          </a:p>
+        </p:txBody>
+      </p:sp>
+      <p:sp>
+        <p:nvSpPr>
+          <p:cNvPr id="6" name="Espace réservé du contenu 5">
+            <a:extLst>
+              <a:ext uri="{FF2B5EF4-FFF2-40B4-BE49-F238E27FC236}">
+                <a16:creationId xmlns:a16="http://schemas.microsoft.com/office/drawing/2014/main" id="{FDF75762-B62D-4D5F-8B9E-BDBB9FB73EEF}"/>
+              </a:ext>
+            </a:extLst>
+          </p:cNvPr>
+          <p:cNvSpPr>
+            <a:spLocks noGrp="1"/>
+          </p:cNvSpPr>
+          <p:nvPr>
+            <p:ph sz="quarter" idx="4"/>
+          </p:nvPr>
+        </p:nvSpPr>
+        <p:spPr/>
+        <p:txBody>
+          <a:bodyPr/>
+          <a:lstStyle/>
+          <a:p>
+            <a:r>
+              <a:rPr lang="fr-FR" dirty="0"/>
+              <a:t>Benjamin et Chaimae : Mise en commun du frontend et du backend</a:t>
+            </a:r>
+          </a:p>
+        </p:txBody>
+      </p:sp>
+      <p:sp>
+        <p:nvSpPr>
+          <p:cNvPr id="7" name="Espace réservé de la date 6">
+            <a:extLst>
+              <a:ext uri="{FF2B5EF4-FFF2-40B4-BE49-F238E27FC236}">
+                <a16:creationId xmlns:a16="http://schemas.microsoft.com/office/drawing/2014/main" id="{26AB8F89-2FC9-4DB8-A835-D3004AD29510}"/>
+              </a:ext>
+            </a:extLst>
+          </p:cNvPr>
+          <p:cNvSpPr>
+            <a:spLocks noGrp="1"/>
+          </p:cNvSpPr>
+          <p:nvPr>
             <p:ph type="dt" sz="half" idx="10"/>
           </p:nvPr>
         </p:nvSpPr>
@@ -6430,9 +6879,9 @@
           <a:lstStyle/>
           <a:p>
             <a:pPr rtl="0"/>
-            <a:fld id="{802FE938-1586-4780-B61A-DD3B60BAB93C}" type="datetime1">
+            <a:fld id="{007B49E2-AD49-4B10-A213-CF194D4A25A3}" type="datetime1">
               <a:rPr lang="fr-FR" smtClean="0"/>
-              <a:t>16/08/2021</a:t>
+              <a:t>17/08/2021</a:t>
             </a:fld>
             <a:endParaRPr lang="en-US"/>
           </a:p>
@@ -6441,7 +6890,7 @@
     </p:spTree>
     <p:extLst>
       <p:ext uri="{BB962C8B-B14F-4D97-AF65-F5344CB8AC3E}">
-        <p14:creationId xmlns:p14="http://schemas.microsoft.com/office/powerpoint/2010/main" val="3783455933"/>
+        <p14:creationId xmlns:p14="http://schemas.microsoft.com/office/powerpoint/2010/main" val="239677393"/>
       </p:ext>
     </p:extLst>
   </p:cSld>
@@ -6473,7 +6922,7 @@
           <p:cNvPr id="2" name="Titre 1">
             <a:extLst>
               <a:ext uri="{FF2B5EF4-FFF2-40B4-BE49-F238E27FC236}">
-                <a16:creationId xmlns:a16="http://schemas.microsoft.com/office/drawing/2014/main" id="{5BA5B894-E1FE-4E91-8BEC-45579577C23F}"/>
+                <a16:creationId xmlns:a16="http://schemas.microsoft.com/office/drawing/2014/main" id="{138BF542-1475-4F67-960B-AD7AC244D790}"/>
               </a:ext>
             </a:extLst>
           </p:cNvPr>
@@ -6481,27 +6930,49 @@
             <a:spLocks noGrp="1"/>
           </p:cNvSpPr>
           <p:nvPr>
-            <p:ph type="ctrTitle"/>
+            <p:ph type="title"/>
           </p:nvPr>
         </p:nvSpPr>
         <p:spPr/>
         <p:txBody>
-          <a:bodyPr>
-            <a:normAutofit/>
-          </a:bodyPr>
+          <a:bodyPr/>
           <a:lstStyle/>
           <a:p>
             <a:r>
               <a:rPr lang="fr-FR" dirty="0"/>
-              <a:t>Sprint 2 :</a:t>
-            </a:r>
-            <a:br>
-              <a:rPr lang="fr-FR" dirty="0"/>
-            </a:br>
-            <a:r>
-              <a:rPr lang="fr-FR" dirty="0"/>
-              <a:t>e-commerce</a:t>
-            </a:r>
+              <a:t>Sprint </a:t>
+            </a:r>
+            <a:r>
+              <a:rPr lang="fr-FR" dirty="0" err="1"/>
+              <a:t>Review</a:t>
+            </a:r>
+            <a:endParaRPr lang="fr-FR" dirty="0"/>
+          </a:p>
+        </p:txBody>
+      </p:sp>
+      <p:sp>
+        <p:nvSpPr>
+          <p:cNvPr id="3" name="Espace réservé du contenu 2">
+            <a:extLst>
+              <a:ext uri="{FF2B5EF4-FFF2-40B4-BE49-F238E27FC236}">
+                <a16:creationId xmlns:a16="http://schemas.microsoft.com/office/drawing/2014/main" id="{C81E2F24-0AFE-495E-88D9-C4BE720FEAE5}"/>
+              </a:ext>
+            </a:extLst>
+          </p:cNvPr>
+          <p:cNvSpPr>
+            <a:spLocks noGrp="1"/>
+          </p:cNvSpPr>
+          <p:nvPr>
+            <p:ph idx="1"/>
+          </p:nvPr>
+        </p:nvSpPr>
+        <p:spPr/>
+        <p:txBody>
+          <a:bodyPr/>
+          <a:lstStyle/>
+          <a:p>
+            <a:pPr lvl="1"/>
+            <a:endParaRPr lang="fr-FR" dirty="0"/>
           </a:p>
         </p:txBody>
       </p:sp>
@@ -6510,7 +6981,7 @@
           <p:cNvPr id="4" name="Espace réservé de la date 3">
             <a:extLst>
               <a:ext uri="{FF2B5EF4-FFF2-40B4-BE49-F238E27FC236}">
-                <a16:creationId xmlns:a16="http://schemas.microsoft.com/office/drawing/2014/main" id="{014183DE-9821-4688-9E3D-A6A00E9C308F}"/>
+                <a16:creationId xmlns:a16="http://schemas.microsoft.com/office/drawing/2014/main" id="{7F6B6DF8-1348-4226-A446-7F3B64E68843}"/>
               </a:ext>
             </a:extLst>
           </p:cNvPr>
@@ -6527,18 +6998,18 @@
           <a:lstStyle/>
           <a:p>
             <a:pPr rtl="0"/>
-            <a:fld id="{43B6331D-8BD5-4AF5-97EE-8FB3C79FE924}" type="datetime1">
+            <a:fld id="{802FE938-1586-4780-B61A-DD3B60BAB93C}" type="datetime1">
               <a:rPr lang="fr-FR" smtClean="0"/>
-              <a:t>16/08/2021</a:t>
+              <a:t>17/08/2021</a:t>
             </a:fld>
-            <a:endParaRPr lang="en-US" dirty="0"/>
+            <a:endParaRPr lang="en-US"/>
           </a:p>
         </p:txBody>
       </p:sp>
     </p:spTree>
     <p:extLst>
       <p:ext uri="{BB962C8B-B14F-4D97-AF65-F5344CB8AC3E}">
-        <p14:creationId xmlns:p14="http://schemas.microsoft.com/office/powerpoint/2010/main" val="3496279981"/>
+        <p14:creationId xmlns:p14="http://schemas.microsoft.com/office/powerpoint/2010/main" val="3783455933"/>
       </p:ext>
     </p:extLst>
   </p:cSld>
@@ -6570,7 +7041,7 @@
           <p:cNvPr id="2" name="Titre 1">
             <a:extLst>
               <a:ext uri="{FF2B5EF4-FFF2-40B4-BE49-F238E27FC236}">
-                <a16:creationId xmlns:a16="http://schemas.microsoft.com/office/drawing/2014/main" id="{138BF542-1475-4F67-960B-AD7AC244D790}"/>
+                <a16:creationId xmlns:a16="http://schemas.microsoft.com/office/drawing/2014/main" id="{5BA5B894-E1FE-4E91-8BEC-45579577C23F}"/>
               </a:ext>
             </a:extLst>
           </p:cNvPr>
@@ -6578,32 +7049,36 @@
             <a:spLocks noGrp="1"/>
           </p:cNvSpPr>
           <p:nvPr>
-            <p:ph type="title"/>
+            <p:ph type="ctrTitle"/>
           </p:nvPr>
         </p:nvSpPr>
         <p:spPr/>
         <p:txBody>
-          <a:bodyPr/>
+          <a:bodyPr>
+            <a:normAutofit/>
+          </a:bodyPr>
           <a:lstStyle/>
           <a:p>
             <a:r>
               <a:rPr lang="fr-FR" dirty="0"/>
-              <a:t>Sprint </a:t>
-            </a:r>
-            <a:r>
-              <a:rPr lang="fr-FR" dirty="0" err="1"/>
-              <a:t>Review</a:t>
-            </a:r>
-            <a:endParaRPr lang="fr-FR" dirty="0"/>
-          </a:p>
-        </p:txBody>
-      </p:sp>
-      <p:sp>
-        <p:nvSpPr>
-          <p:cNvPr id="3" name="Espace réservé du contenu 2">
+              <a:t>Sprint 2 :</a:t>
+            </a:r>
+            <a:br>
+              <a:rPr lang="fr-FR" dirty="0"/>
+            </a:br>
+            <a:r>
+              <a:rPr lang="fr-FR" dirty="0"/>
+              <a:t>e-commerce</a:t>
+            </a:r>
+          </a:p>
+        </p:txBody>
+      </p:sp>
+      <p:sp>
+        <p:nvSpPr>
+          <p:cNvPr id="4" name="Espace réservé de la date 3">
             <a:extLst>
               <a:ext uri="{FF2B5EF4-FFF2-40B4-BE49-F238E27FC236}">
-                <a16:creationId xmlns:a16="http://schemas.microsoft.com/office/drawing/2014/main" id="{C81E2F24-0AFE-495E-88D9-C4BE720FEAE5}"/>
+                <a16:creationId xmlns:a16="http://schemas.microsoft.com/office/drawing/2014/main" id="{014183DE-9821-4688-9E3D-A6A00E9C308F}"/>
               </a:ext>
             </a:extLst>
           </p:cNvPr>
@@ -6611,7 +7086,7 @@
             <a:spLocks noGrp="1"/>
           </p:cNvSpPr>
           <p:nvPr>
-            <p:ph idx="1"/>
+            <p:ph type="dt" sz="half" idx="10"/>
           </p:nvPr>
         </p:nvSpPr>
         <p:spPr/>
@@ -6619,44 +7094,19 @@
           <a:bodyPr/>
           <a:lstStyle/>
           <a:p>
-            <a:endParaRPr lang="fr-FR"/>
-          </a:p>
-        </p:txBody>
-      </p:sp>
-      <p:sp>
-        <p:nvSpPr>
-          <p:cNvPr id="4" name="Espace réservé de la date 3">
-            <a:extLst>
-              <a:ext uri="{FF2B5EF4-FFF2-40B4-BE49-F238E27FC236}">
-                <a16:creationId xmlns:a16="http://schemas.microsoft.com/office/drawing/2014/main" id="{7F6B6DF8-1348-4226-A446-7F3B64E68843}"/>
-              </a:ext>
-            </a:extLst>
-          </p:cNvPr>
-          <p:cNvSpPr>
-            <a:spLocks noGrp="1"/>
-          </p:cNvSpPr>
-          <p:nvPr>
-            <p:ph type="dt" sz="half" idx="10"/>
-          </p:nvPr>
-        </p:nvSpPr>
-        <p:spPr/>
-        <p:txBody>
-          <a:bodyPr/>
-          <a:lstStyle/>
-          <a:p>
             <a:pPr rtl="0"/>
-            <a:fld id="{802FE938-1586-4780-B61A-DD3B60BAB93C}" type="datetime1">
+            <a:fld id="{43B6331D-8BD5-4AF5-97EE-8FB3C79FE924}" type="datetime1">
               <a:rPr lang="fr-FR" smtClean="0"/>
-              <a:t>16/08/2021</a:t>
+              <a:t>17/08/2021</a:t>
             </a:fld>
-            <a:endParaRPr lang="en-US"/>
+            <a:endParaRPr lang="en-US" dirty="0"/>
           </a:p>
         </p:txBody>
       </p:sp>
     </p:spTree>
     <p:extLst>
       <p:ext uri="{BB962C8B-B14F-4D97-AF65-F5344CB8AC3E}">
-        <p14:creationId xmlns:p14="http://schemas.microsoft.com/office/powerpoint/2010/main" val="2947631941"/>
+        <p14:creationId xmlns:p14="http://schemas.microsoft.com/office/powerpoint/2010/main" val="3496279981"/>
       </p:ext>
     </p:extLst>
   </p:cSld>

</xml_diff>